<commit_message>
update slides and readme
</commit_message>
<xml_diff>
--- a/slides/01 - T1 - I database NoSQL.pptx
+++ b/slides/01 - T1 - I database NoSQL.pptx
@@ -293,7 +293,7 @@
           <a:p>
             <a:fld id="{02297A90-1AFB-4FA1-ADF2-69FD2D1230BA}" type="datetimeFigureOut">
               <a:rPr lang="en-US" smtClean="0"/>
-              <a:t>1/10/2022</a:t>
+              <a:t>1/26/2022</a:t>
             </a:fld>
             <a:endParaRPr lang="en-US"/>
           </a:p>
@@ -371,7 +371,7 @@
           <a:p>
             <a:fld id="{42AE2D9A-5B89-4689-B04D-3FBBAA04CE2B}" type="slidenum">
               <a:rPr lang="en-US" smtClean="0"/>
-              <a:t>‹#›</a:t>
+              <a:t>‹N›</a:t>
             </a:fld>
             <a:endParaRPr lang="en-US"/>
           </a:p>
@@ -471,7 +471,7 @@
           <a:p>
             <a:fld id="{2D15495C-7C85-4DFE-8C2B-354A7A489EB6}" type="datetimeFigureOut">
               <a:rPr lang="it-IT" smtClean="0"/>
-              <a:t>10/01/2022</a:t>
+              <a:t>26/01/2022</a:t>
             </a:fld>
             <a:endParaRPr lang="it-IT"/>
           </a:p>
@@ -629,7 +629,7 @@
           <a:p>
             <a:fld id="{D98EE9EE-A74D-4412-94DD-33E68A97493E}" type="slidenum">
               <a:rPr lang="it-IT" smtClean="0"/>
-              <a:t>‹#›</a:t>
+              <a:t>‹N›</a:t>
             </a:fld>
             <a:endParaRPr lang="it-IT"/>
           </a:p>
@@ -5327,7 +5327,7 @@
           <a:p>
             <a:fld id="{5DD6F1BA-2510-46FC-9346-AB1F3CA1593B}" type="slidenum">
               <a:rPr lang="it-IT" smtClean="0"/>
-              <a:t>‹#›</a:t>
+              <a:t>‹N›</a:t>
             </a:fld>
             <a:endParaRPr lang="it-IT"/>
           </a:p>
@@ -5950,7 +5950,7 @@
             <a:fld id="{190FD6C2-E3ED-40C5-8699-39D0C34FA95B}" type="slidenum">
               <a:rPr lang="en-US" smtClean="0"/>
               <a:pPr/>
-              <a:t>‹#›</a:t>
+              <a:t>‹N›</a:t>
             </a:fld>
             <a:endParaRPr lang="en-US" dirty="0"/>
           </a:p>
@@ -21066,7 +21066,7 @@
             </a:r>
             <a:r>
               <a:rPr lang="it-IT" dirty="0"/>
-              <a:t>..</a:t>
+              <a:t>…</a:t>
             </a:r>
             <a:endParaRPr lang="it-IT" noProof="0" dirty="0"/>
           </a:p>
@@ -21078,7 +21078,7 @@
                   <a:srgbClr val="0070C0"/>
                 </a:solidFill>
               </a:rPr>
-              <a:t>..ma </a:t>
+              <a:t>… ma </a:t>
             </a:r>
             <a:r>
               <a:rPr lang="it-IT" noProof="0" dirty="0">
@@ -23097,7 +23097,7 @@
                   <a:srgbClr val="0070C0"/>
                 </a:solidFill>
               </a:rPr>
-              <a:t>Il </a:t>
+              <a:t>Il fallimento (</a:t>
             </a:r>
             <a:r>
               <a:rPr lang="it-IT" noProof="0" dirty="0" err="1">
@@ -23106,6 +23106,14 @@
                 </a:solidFill>
               </a:rPr>
               <a:t>failure</a:t>
+            </a:r>
+            <a:r>
+              <a:rPr lang="it-IT" dirty="0">
+                <a:solidFill>
+                  <a:srgbClr val="0070C0"/>
+                </a:solidFill>
+              </a:rPr>
+              <a:t>)</a:t>
             </a:r>
             <a:r>
               <a:rPr lang="it-IT" noProof="0" dirty="0">
@@ -23150,228 +23158,30 @@
           <a:p>
             <a:pPr lvl="2"/>
             <a:r>
-              <a:rPr lang="en-US" dirty="0"/>
-              <a:t>Due </a:t>
-            </a:r>
-            <a:r>
-              <a:rPr lang="en-US" dirty="0" err="1"/>
-              <a:t>utenti</a:t>
-            </a:r>
-            <a:r>
-              <a:rPr lang="en-US" dirty="0"/>
-              <a:t> </a:t>
-            </a:r>
-            <a:r>
-              <a:rPr lang="en-US" dirty="0" err="1"/>
-              <a:t>possono</a:t>
-            </a:r>
-            <a:r>
-              <a:rPr lang="en-US" dirty="0"/>
-              <a:t> </a:t>
-            </a:r>
-            <a:r>
-              <a:rPr lang="en-US" dirty="0" err="1"/>
-              <a:t>leggere</a:t>
-            </a:r>
-            <a:r>
-              <a:rPr lang="en-US" dirty="0"/>
-              <a:t> </a:t>
-            </a:r>
-            <a:r>
-              <a:rPr lang="en-US" dirty="0" err="1"/>
-              <a:t>valori</a:t>
-            </a:r>
-            <a:r>
-              <a:rPr lang="en-US" dirty="0"/>
-              <a:t> </a:t>
-            </a:r>
-            <a:r>
-              <a:rPr lang="en-US" dirty="0" err="1"/>
-              <a:t>diversi</a:t>
-            </a:r>
-            <a:r>
-              <a:rPr lang="en-US" dirty="0"/>
-              <a:t> </a:t>
-            </a:r>
-            <a:r>
-              <a:rPr lang="en-US" dirty="0" err="1"/>
-              <a:t>nello</a:t>
-            </a:r>
-            <a:r>
-              <a:rPr lang="en-US" dirty="0"/>
-              <a:t> </a:t>
-            </a:r>
-            <a:r>
-              <a:rPr lang="en-US" dirty="0" err="1"/>
-              <a:t>stesso</a:t>
-            </a:r>
-            <a:r>
-              <a:rPr lang="en-US" dirty="0"/>
-              <a:t> </a:t>
-            </a:r>
-            <a:r>
-              <a:rPr lang="en-US" dirty="0" err="1"/>
-              <a:t>momento</a:t>
-            </a:r>
-            <a:endParaRPr lang="en-US" dirty="0"/>
+              <a:rPr lang="it-IT"/>
+              <a:t>Due utenti possono leggere valori diversi nello stesso momento</a:t>
+            </a:r>
           </a:p>
           <a:p>
             <a:pPr lvl="2"/>
             <a:r>
-              <a:rPr lang="en-US" dirty="0">
+              <a:rPr lang="it-IT">
                 <a:solidFill>
                   <a:srgbClr val="FF0000"/>
                 </a:solidFill>
               </a:rPr>
-              <a:t>Le </a:t>
-            </a:r>
-            <a:r>
-              <a:rPr lang="en-US" dirty="0" err="1">
-                <a:solidFill>
-                  <a:srgbClr val="FF0000"/>
-                </a:solidFill>
-              </a:rPr>
-              <a:t>inconsistenze</a:t>
-            </a:r>
-            <a:r>
-              <a:rPr lang="en-US" dirty="0">
-                <a:solidFill>
-                  <a:srgbClr val="FF0000"/>
-                </a:solidFill>
-              </a:rPr>
-              <a:t> in </a:t>
-            </a:r>
-            <a:r>
-              <a:rPr lang="en-US" dirty="0" err="1">
-                <a:solidFill>
-                  <a:srgbClr val="FF0000"/>
-                </a:solidFill>
-              </a:rPr>
-              <a:t>lettura</a:t>
-            </a:r>
-            <a:r>
-              <a:rPr lang="en-US" dirty="0">
-                <a:solidFill>
-                  <a:srgbClr val="FF0000"/>
-                </a:solidFill>
-              </a:rPr>
-              <a:t> </a:t>
-            </a:r>
-            <a:r>
-              <a:rPr lang="en-US" dirty="0" err="1">
-                <a:solidFill>
-                  <a:srgbClr val="FF0000"/>
-                </a:solidFill>
-              </a:rPr>
-              <a:t>possono</a:t>
-            </a:r>
-            <a:r>
-              <a:rPr lang="en-US" dirty="0">
-                <a:solidFill>
-                  <a:srgbClr val="FF0000"/>
-                </a:solidFill>
-              </a:rPr>
-              <a:t> </a:t>
-            </a:r>
-            <a:r>
-              <a:rPr lang="en-US" dirty="0" err="1">
-                <a:solidFill>
-                  <a:srgbClr val="FF0000"/>
-                </a:solidFill>
-              </a:rPr>
-              <a:t>essere</a:t>
-            </a:r>
-            <a:r>
-              <a:rPr lang="en-US" dirty="0">
-                <a:solidFill>
-                  <a:srgbClr val="FF0000"/>
-                </a:solidFill>
-              </a:rPr>
-              <a:t> </a:t>
-            </a:r>
-            <a:r>
-              <a:rPr lang="en-US" dirty="0" err="1">
-                <a:solidFill>
-                  <a:srgbClr val="FF0000"/>
-                </a:solidFill>
-              </a:rPr>
-              <a:t>problemantiche</a:t>
-            </a:r>
-            <a:r>
-              <a:rPr lang="en-US" dirty="0">
-                <a:solidFill>
-                  <a:srgbClr val="FF0000"/>
-                </a:solidFill>
-              </a:rPr>
-              <a:t>, ma </a:t>
-            </a:r>
-            <a:r>
-              <a:rPr lang="en-US" dirty="0" err="1">
-                <a:solidFill>
-                  <a:srgbClr val="FF0000"/>
-                </a:solidFill>
-              </a:rPr>
-              <a:t>hanno</a:t>
-            </a:r>
-            <a:r>
-              <a:rPr lang="en-US" dirty="0">
-                <a:solidFill>
-                  <a:srgbClr val="FF0000"/>
-                </a:solidFill>
-              </a:rPr>
-              <a:t> </a:t>
-            </a:r>
-            <a:r>
-              <a:rPr lang="en-US" dirty="0" err="1">
-                <a:solidFill>
-                  <a:srgbClr val="FF0000"/>
-                </a:solidFill>
-              </a:rPr>
-              <a:t>una</a:t>
-            </a:r>
-            <a:r>
-              <a:rPr lang="en-US" dirty="0">
-                <a:solidFill>
-                  <a:srgbClr val="FF0000"/>
-                </a:solidFill>
-              </a:rPr>
-              <a:t> </a:t>
-            </a:r>
-            <a:r>
-              <a:rPr lang="en-US" dirty="0" err="1">
-                <a:solidFill>
-                  <a:srgbClr val="FF0000"/>
-                </a:solidFill>
-              </a:rPr>
-              <a:t>durata</a:t>
-            </a:r>
-            <a:r>
-              <a:rPr lang="en-US" dirty="0">
-                <a:solidFill>
-                  <a:srgbClr val="FF0000"/>
-                </a:solidFill>
-              </a:rPr>
-              <a:t> </a:t>
-            </a:r>
-            <a:r>
-              <a:rPr lang="en-US" dirty="0" err="1">
-                <a:solidFill>
-                  <a:srgbClr val="FF0000"/>
-                </a:solidFill>
-              </a:rPr>
-              <a:t>limitata</a:t>
-            </a:r>
-            <a:endParaRPr lang="en-US" dirty="0">
-              <a:solidFill>
-                <a:srgbClr val="FF0000"/>
-              </a:solidFill>
-            </a:endParaRPr>
+              <a:t>Le inconsistenze in lettura possono essere problematiche, ma hanno una durata limitata</a:t>
+            </a:r>
           </a:p>
           <a:p>
             <a:pPr lvl="2"/>
             <a:r>
-              <a:rPr lang="it-IT" dirty="0"/>
-              <a:t>E’ lo stesso problema che occorre in replicazione master-slave</a:t>
+              <a:rPr lang="it-IT"/>
+              <a:t>E</a:t>
+            </a:r>
+            <a:r>
+              <a:rPr lang="it-IT" dirty="0"/>
+              <a:t>’ lo stesso problema che occorre in replicazione master-slave</a:t>
             </a:r>
             <a:endParaRPr lang="it-IT" dirty="0">
               <a:solidFill>
@@ -26419,13 +26229,13 @@
             </a:r>
             <a:r>
               <a:rPr lang="it-IT" dirty="0"/>
-              <a:t>..</a:t>
-            </a:r>
-          </a:p>
-          <a:p>
-            <a:r>
-              <a:rPr lang="it-IT" dirty="0"/>
-              <a:t>..piuttosto come proprietà che </a:t>
+              <a:t>…</a:t>
+            </a:r>
+          </a:p>
+          <a:p>
+            <a:r>
+              <a:rPr lang="it-IT" dirty="0"/>
+              <a:t>… piuttosto come proprietà che </a:t>
             </a:r>
             <a:r>
               <a:rPr lang="it-IT" i="1" dirty="0"/>
@@ -26680,19 +26490,7 @@
               <a:rPr lang="it-IT" dirty="0">
                 <a:sym typeface="Wingdings" panose="05000000000000000000" pitchFamily="2" charset="2"/>
               </a:rPr>
-              <a:t>Focus su </a:t>
-            </a:r>
-            <a:r>
-              <a:rPr lang="it-IT" dirty="0" err="1">
-                <a:sym typeface="Wingdings" panose="05000000000000000000" pitchFamily="2" charset="2"/>
-              </a:rPr>
-              <a:t>throughput</a:t>
-            </a:r>
-            <a:r>
-              <a:rPr lang="it-IT" dirty="0">
-                <a:sym typeface="Wingdings" panose="05000000000000000000" pitchFamily="2" charset="2"/>
-              </a:rPr>
-              <a:t> piuttosto che su consistenza</a:t>
+              <a:t>Focus su throughput piuttosto che su consistenza</a:t>
             </a:r>
             <a:endParaRPr lang="it-IT" dirty="0"/>
           </a:p>
@@ -32893,7 +32691,7 @@
                   <a:srgbClr val="0070C0"/>
                 </a:solidFill>
               </a:rPr>
-              <a:t>Utilizzare un singolo DBMS per gestire tutti i requisiti …</a:t>
+              <a:t>Utilizzare un singolo DBMS per gestire tutti i requisiti…</a:t>
             </a:r>
           </a:p>
           <a:p>
@@ -32985,7 +32783,7 @@
         </p:blipFill>
         <p:spPr bwMode="auto">
           <a:xfrm>
-            <a:off x="7632469" y="1909090"/>
+            <a:off x="8686800" y="2518690"/>
             <a:ext cx="2667000" cy="2000250"/>
           </a:xfrm>
           <a:prstGeom prst="rect">

</xml_diff>

<commit_message>
Update 01 - T1 - I database NoSQL.pptx
update slides
</commit_message>
<xml_diff>
--- a/slides/01 - T1 - I database NoSQL.pptx
+++ b/slides/01 - T1 - I database NoSQL.pptx
@@ -195,6 +195,9 @@
     <p:ext uri="{EFAFB233-063F-42B5-8137-9DF3F51BA10A}">
       <p15:sldGuideLst xmlns:p15="http://schemas.microsoft.com/office/powerpoint/2012/main"/>
     </p:ext>
+    <p:ext uri="{2D200454-40CA-4A62-9FC3-DE9A4176ACB9}">
+      <p15:notesGuideLst xmlns:p15="http://schemas.microsoft.com/office/powerpoint/2012/main"/>
+    </p:ext>
   </p:extLst>
 </p:presentation>
 </file>
@@ -293,7 +296,7 @@
           <a:p>
             <a:fld id="{02297A90-1AFB-4FA1-ADF2-69FD2D1230BA}" type="datetimeFigureOut">
               <a:rPr lang="en-US" smtClean="0"/>
-              <a:t>2/17/2022</a:t>
+              <a:t>1/3/2023</a:t>
             </a:fld>
             <a:endParaRPr lang="en-US"/>
           </a:p>
@@ -371,7 +374,7 @@
           <a:p>
             <a:fld id="{42AE2D9A-5B89-4689-B04D-3FBBAA04CE2B}" type="slidenum">
               <a:rPr lang="en-US" smtClean="0"/>
-              <a:t>‹#›</a:t>
+              <a:t>‹N›</a:t>
             </a:fld>
             <a:endParaRPr lang="en-US"/>
           </a:p>
@@ -385,7 +388,7 @@
     </p:extLst>
   </p:cSld>
   <p:clrMap bg1="lt1" tx1="dk1" bg2="lt2" tx2="dk2" accent1="accent1" accent2="accent2" accent3="accent3" accent4="accent4" accent5="accent5" accent6="accent6" hlink="hlink" folHlink="folHlink"/>
-  <p:hf hdr="0" ftr="0" dt="0"/>
+  <p:hf sldNum="0" hdr="0" ftr="0" dt="0"/>
 </p:handoutMaster>
 </file>
 
@@ -471,7 +474,7 @@
           <a:p>
             <a:fld id="{2D15495C-7C85-4DFE-8C2B-354A7A489EB6}" type="datetimeFigureOut">
               <a:rPr lang="it-IT" smtClean="0"/>
-              <a:t>17/02/2022</a:t>
+              <a:t>03/01/2023</a:t>
             </a:fld>
             <a:endParaRPr lang="it-IT"/>
           </a:p>
@@ -629,7 +632,7 @@
           <a:p>
             <a:fld id="{D98EE9EE-A74D-4412-94DD-33E68A97493E}" type="slidenum">
               <a:rPr lang="it-IT" smtClean="0"/>
-              <a:t>‹#›</a:t>
+              <a:t>‹N›</a:t>
             </a:fld>
             <a:endParaRPr lang="it-IT"/>
           </a:p>
@@ -643,7 +646,7 @@
     </p:extLst>
   </p:cSld>
   <p:clrMap bg1="lt1" tx1="dk1" bg2="lt2" tx2="dk2" accent1="accent1" accent2="accent2" accent3="accent3" accent4="accent4" accent5="accent5" accent6="accent6" hlink="hlink" folHlink="folHlink"/>
-  <p:hf hdr="0" ftr="0" dt="0"/>
+  <p:hf sldNum="0" hdr="0" ftr="0" dt="0"/>
   <p:notesStyle>
     <a:lvl1pPr marL="0" algn="l" defTabSz="914400" rtl="0" eaLnBrk="1" latinLnBrk="0" hangingPunct="1">
       <a:defRPr sz="1200" kern="1200">
@@ -787,29 +790,6 @@
           </a:p>
         </p:txBody>
       </p:sp>
-      <p:sp>
-        <p:nvSpPr>
-          <p:cNvPr id="4" name="Segnaposto numero diapositiva 3"/>
-          <p:cNvSpPr>
-            <a:spLocks noGrp="1"/>
-          </p:cNvSpPr>
-          <p:nvPr>
-            <p:ph type="sldNum" sz="quarter" idx="10"/>
-          </p:nvPr>
-        </p:nvSpPr>
-        <p:spPr/>
-        <p:txBody>
-          <a:bodyPr/>
-          <a:lstStyle/>
-          <a:p>
-            <a:pPr rtl="0"/>
-            <a:r>
-              <a:rPr lang="en-US" dirty="0"/>
-              <a:t>‹n.›</a:t>
-            </a:r>
-          </a:p>
-        </p:txBody>
-      </p:sp>
     </p:spTree>
     <p:extLst>
       <p:ext uri="{BB962C8B-B14F-4D97-AF65-F5344CB8AC3E}">
@@ -868,29 +848,6 @@
           <a:lstStyle/>
           <a:p>
             <a:endParaRPr lang="it-IT" dirty="0"/>
-          </a:p>
-        </p:txBody>
-      </p:sp>
-      <p:sp>
-        <p:nvSpPr>
-          <p:cNvPr id="4" name="Segnaposto numero diapositiva 3"/>
-          <p:cNvSpPr>
-            <a:spLocks noGrp="1"/>
-          </p:cNvSpPr>
-          <p:nvPr>
-            <p:ph type="sldNum" sz="quarter" idx="10"/>
-          </p:nvPr>
-        </p:nvSpPr>
-        <p:spPr/>
-        <p:txBody>
-          <a:bodyPr/>
-          <a:lstStyle/>
-          <a:p>
-            <a:fld id="{B38CEA09-33FA-4F6C-9D30-5FB0AA0E11C3}" type="slidenum">
-              <a:rPr lang="it-IT" smtClean="0"/>
-              <a:t>37</a:t>
-            </a:fld>
-            <a:endParaRPr lang="it-IT"/>
           </a:p>
         </p:txBody>
       </p:sp>
@@ -955,29 +912,6 @@
           </a:p>
         </p:txBody>
       </p:sp>
-      <p:sp>
-        <p:nvSpPr>
-          <p:cNvPr id="4" name="Segnaposto numero diapositiva 3"/>
-          <p:cNvSpPr>
-            <a:spLocks noGrp="1"/>
-          </p:cNvSpPr>
-          <p:nvPr>
-            <p:ph type="sldNum" sz="quarter" idx="10"/>
-          </p:nvPr>
-        </p:nvSpPr>
-        <p:spPr/>
-        <p:txBody>
-          <a:bodyPr/>
-          <a:lstStyle/>
-          <a:p>
-            <a:fld id="{B38CEA09-33FA-4F6C-9D30-5FB0AA0E11C3}" type="slidenum">
-              <a:rPr lang="it-IT" smtClean="0"/>
-              <a:t>38</a:t>
-            </a:fld>
-            <a:endParaRPr lang="it-IT"/>
-          </a:p>
-        </p:txBody>
-      </p:sp>
     </p:spTree>
     <p:extLst>
       <p:ext uri="{BB962C8B-B14F-4D97-AF65-F5344CB8AC3E}">
@@ -1039,29 +973,6 @@
               <a:rPr lang="it-IT" dirty="0"/>
               <a:t>Parliamo di replica completa, per ora</a:t>
             </a:r>
-          </a:p>
-        </p:txBody>
-      </p:sp>
-      <p:sp>
-        <p:nvSpPr>
-          <p:cNvPr id="4" name="Segnaposto numero diapositiva 3"/>
-          <p:cNvSpPr>
-            <a:spLocks noGrp="1"/>
-          </p:cNvSpPr>
-          <p:nvPr>
-            <p:ph type="sldNum" sz="quarter" idx="10"/>
-          </p:nvPr>
-        </p:nvSpPr>
-        <p:spPr/>
-        <p:txBody>
-          <a:bodyPr/>
-          <a:lstStyle/>
-          <a:p>
-            <a:fld id="{B38CEA09-33FA-4F6C-9D30-5FB0AA0E11C3}" type="slidenum">
-              <a:rPr lang="it-IT" smtClean="0"/>
-              <a:t>39</a:t>
-            </a:fld>
-            <a:endParaRPr lang="it-IT"/>
           </a:p>
         </p:txBody>
       </p:sp>
@@ -1129,29 +1040,6 @@
           </a:p>
         </p:txBody>
       </p:sp>
-      <p:sp>
-        <p:nvSpPr>
-          <p:cNvPr id="4" name="Segnaposto numero diapositiva 3"/>
-          <p:cNvSpPr>
-            <a:spLocks noGrp="1"/>
-          </p:cNvSpPr>
-          <p:nvPr>
-            <p:ph type="sldNum" sz="quarter" idx="10"/>
-          </p:nvPr>
-        </p:nvSpPr>
-        <p:spPr/>
-        <p:txBody>
-          <a:bodyPr/>
-          <a:lstStyle/>
-          <a:p>
-            <a:fld id="{B38CEA09-33FA-4F6C-9D30-5FB0AA0E11C3}" type="slidenum">
-              <a:rPr lang="it-IT" smtClean="0"/>
-              <a:t>40</a:t>
-            </a:fld>
-            <a:endParaRPr lang="it-IT"/>
-          </a:p>
-        </p:txBody>
-      </p:sp>
     </p:spTree>
     <p:extLst>
       <p:ext uri="{BB962C8B-B14F-4D97-AF65-F5344CB8AC3E}">
@@ -1218,29 +1106,6 @@
               <a:t> conflitti in scrittura? Quorum, l‘ultimo vince o segnalazione.</a:t>
             </a:r>
             <a:endParaRPr lang="it-IT" dirty="0"/>
-          </a:p>
-        </p:txBody>
-      </p:sp>
-      <p:sp>
-        <p:nvSpPr>
-          <p:cNvPr id="4" name="Segnaposto numero diapositiva 3"/>
-          <p:cNvSpPr>
-            <a:spLocks noGrp="1"/>
-          </p:cNvSpPr>
-          <p:nvPr>
-            <p:ph type="sldNum" sz="quarter" idx="10"/>
-          </p:nvPr>
-        </p:nvSpPr>
-        <p:spPr/>
-        <p:txBody>
-          <a:bodyPr/>
-          <a:lstStyle/>
-          <a:p>
-            <a:fld id="{B38CEA09-33FA-4F6C-9D30-5FB0AA0E11C3}" type="slidenum">
-              <a:rPr lang="it-IT" smtClean="0"/>
-              <a:t>43</a:t>
-            </a:fld>
-            <a:endParaRPr lang="it-IT"/>
           </a:p>
         </p:txBody>
       </p:sp>
@@ -1393,29 +1258,6 @@
           </a:p>
         </p:txBody>
       </p:sp>
-      <p:sp>
-        <p:nvSpPr>
-          <p:cNvPr id="4" name="Segnaposto numero diapositiva 3"/>
-          <p:cNvSpPr>
-            <a:spLocks noGrp="1"/>
-          </p:cNvSpPr>
-          <p:nvPr>
-            <p:ph type="sldNum" sz="quarter" idx="10"/>
-          </p:nvPr>
-        </p:nvSpPr>
-        <p:spPr/>
-        <p:txBody>
-          <a:bodyPr/>
-          <a:lstStyle/>
-          <a:p>
-            <a:fld id="{B38CEA09-33FA-4F6C-9D30-5FB0AA0E11C3}" type="slidenum">
-              <a:rPr lang="it-IT" smtClean="0"/>
-              <a:t>44</a:t>
-            </a:fld>
-            <a:endParaRPr lang="it-IT"/>
-          </a:p>
-        </p:txBody>
-      </p:sp>
     </p:spTree>
     <p:extLst>
       <p:ext uri="{BB962C8B-B14F-4D97-AF65-F5344CB8AC3E}">
@@ -1474,29 +1316,6 @@
           <a:lstStyle/>
           <a:p>
             <a:endParaRPr lang="it-IT" dirty="0"/>
-          </a:p>
-        </p:txBody>
-      </p:sp>
-      <p:sp>
-        <p:nvSpPr>
-          <p:cNvPr id="4" name="Segnaposto numero diapositiva 3"/>
-          <p:cNvSpPr>
-            <a:spLocks noGrp="1"/>
-          </p:cNvSpPr>
-          <p:nvPr>
-            <p:ph type="sldNum" sz="quarter" idx="10"/>
-          </p:nvPr>
-        </p:nvSpPr>
-        <p:spPr/>
-        <p:txBody>
-          <a:bodyPr/>
-          <a:lstStyle/>
-          <a:p>
-            <a:fld id="{B38CEA09-33FA-4F6C-9D30-5FB0AA0E11C3}" type="slidenum">
-              <a:rPr lang="it-IT" smtClean="0"/>
-              <a:t>45</a:t>
-            </a:fld>
-            <a:endParaRPr lang="it-IT"/>
           </a:p>
         </p:txBody>
       </p:sp>
@@ -1564,29 +1383,6 @@
           </a:p>
         </p:txBody>
       </p:sp>
-      <p:sp>
-        <p:nvSpPr>
-          <p:cNvPr id="4" name="Segnaposto numero diapositiva 3"/>
-          <p:cNvSpPr>
-            <a:spLocks noGrp="1"/>
-          </p:cNvSpPr>
-          <p:nvPr>
-            <p:ph type="sldNum" sz="quarter" idx="10"/>
-          </p:nvPr>
-        </p:nvSpPr>
-        <p:spPr/>
-        <p:txBody>
-          <a:bodyPr/>
-          <a:lstStyle/>
-          <a:p>
-            <a:fld id="{B38CEA09-33FA-4F6C-9D30-5FB0AA0E11C3}" type="slidenum">
-              <a:rPr lang="it-IT" smtClean="0"/>
-              <a:t>56</a:t>
-            </a:fld>
-            <a:endParaRPr lang="it-IT"/>
-          </a:p>
-        </p:txBody>
-      </p:sp>
     </p:spTree>
     <p:extLst>
       <p:ext uri="{BB962C8B-B14F-4D97-AF65-F5344CB8AC3E}">
@@ -1704,29 +1500,6 @@
               <a:t>Quorum</a:t>
             </a:r>
             <a:endParaRPr lang="it-IT" dirty="0"/>
-          </a:p>
-        </p:txBody>
-      </p:sp>
-      <p:sp>
-        <p:nvSpPr>
-          <p:cNvPr id="4" name="Segnaposto numero diapositiva 3"/>
-          <p:cNvSpPr>
-            <a:spLocks noGrp="1"/>
-          </p:cNvSpPr>
-          <p:nvPr>
-            <p:ph type="sldNum" sz="quarter" idx="10"/>
-          </p:nvPr>
-        </p:nvSpPr>
-        <p:spPr/>
-        <p:txBody>
-          <a:bodyPr/>
-          <a:lstStyle/>
-          <a:p>
-            <a:fld id="{B38CEA09-33FA-4F6C-9D30-5FB0AA0E11C3}" type="slidenum">
-              <a:rPr lang="it-IT" smtClean="0"/>
-              <a:t>57</a:t>
-            </a:fld>
-            <a:endParaRPr lang="it-IT"/>
           </a:p>
         </p:txBody>
       </p:sp>
@@ -1810,29 +1583,6 @@
           </a:p>
         </p:txBody>
       </p:sp>
-      <p:sp>
-        <p:nvSpPr>
-          <p:cNvPr id="4" name="Segnaposto numero diapositiva 3"/>
-          <p:cNvSpPr>
-            <a:spLocks noGrp="1"/>
-          </p:cNvSpPr>
-          <p:nvPr>
-            <p:ph type="sldNum" sz="quarter" idx="10"/>
-          </p:nvPr>
-        </p:nvSpPr>
-        <p:spPr/>
-        <p:txBody>
-          <a:bodyPr/>
-          <a:lstStyle/>
-          <a:p>
-            <a:fld id="{B38CEA09-33FA-4F6C-9D30-5FB0AA0E11C3}" type="slidenum">
-              <a:rPr lang="it-IT" smtClean="0"/>
-              <a:t>61</a:t>
-            </a:fld>
-            <a:endParaRPr lang="it-IT"/>
-          </a:p>
-        </p:txBody>
-      </p:sp>
     </p:spTree>
     <p:extLst>
       <p:ext uri="{BB962C8B-B14F-4D97-AF65-F5344CB8AC3E}">
@@ -2050,29 +1800,6 @@
           </a:p>
           <a:p>
             <a:endParaRPr lang="en-US" dirty="0"/>
-          </a:p>
-        </p:txBody>
-      </p:sp>
-      <p:sp>
-        <p:nvSpPr>
-          <p:cNvPr id="4" name="Segnaposto numero diapositiva 3"/>
-          <p:cNvSpPr>
-            <a:spLocks noGrp="1"/>
-          </p:cNvSpPr>
-          <p:nvPr>
-            <p:ph type="sldNum" sz="quarter" idx="10"/>
-          </p:nvPr>
-        </p:nvSpPr>
-        <p:spPr/>
-        <p:txBody>
-          <a:bodyPr/>
-          <a:lstStyle/>
-          <a:p>
-            <a:fld id="{B38CEA09-33FA-4F6C-9D30-5FB0AA0E11C3}" type="slidenum">
-              <a:rPr lang="it-IT" smtClean="0"/>
-              <a:t>7</a:t>
-            </a:fld>
-            <a:endParaRPr lang="it-IT"/>
           </a:p>
         </p:txBody>
       </p:sp>
@@ -2171,29 +1898,6 @@
           </a:p>
         </p:txBody>
       </p:sp>
-      <p:sp>
-        <p:nvSpPr>
-          <p:cNvPr id="4" name="Segnaposto numero diapositiva 3"/>
-          <p:cNvSpPr>
-            <a:spLocks noGrp="1"/>
-          </p:cNvSpPr>
-          <p:nvPr>
-            <p:ph type="sldNum" sz="quarter" idx="10"/>
-          </p:nvPr>
-        </p:nvSpPr>
-        <p:spPr/>
-        <p:txBody>
-          <a:bodyPr/>
-          <a:lstStyle/>
-          <a:p>
-            <a:fld id="{B38CEA09-33FA-4F6C-9D30-5FB0AA0E11C3}" type="slidenum">
-              <a:rPr lang="it-IT" smtClean="0"/>
-              <a:t>62</a:t>
-            </a:fld>
-            <a:endParaRPr lang="it-IT"/>
-          </a:p>
-        </p:txBody>
-      </p:sp>
     </p:spTree>
     <p:extLst>
       <p:ext uri="{BB962C8B-B14F-4D97-AF65-F5344CB8AC3E}">
@@ -2310,29 +2014,6 @@
           </a:p>
           <a:p>
             <a:endParaRPr lang="en-US" dirty="0"/>
-          </a:p>
-        </p:txBody>
-      </p:sp>
-      <p:sp>
-        <p:nvSpPr>
-          <p:cNvPr id="4" name="Segnaposto numero diapositiva 3"/>
-          <p:cNvSpPr>
-            <a:spLocks noGrp="1"/>
-          </p:cNvSpPr>
-          <p:nvPr>
-            <p:ph type="sldNum" sz="quarter" idx="10"/>
-          </p:nvPr>
-        </p:nvSpPr>
-        <p:spPr/>
-        <p:txBody>
-          <a:bodyPr/>
-          <a:lstStyle/>
-          <a:p>
-            <a:fld id="{B38CEA09-33FA-4F6C-9D30-5FB0AA0E11C3}" type="slidenum">
-              <a:rPr lang="it-IT" smtClean="0"/>
-              <a:t>70</a:t>
-            </a:fld>
-            <a:endParaRPr lang="it-IT"/>
           </a:p>
         </p:txBody>
       </p:sp>
@@ -2500,29 +2181,6 @@
           </a:p>
         </p:txBody>
       </p:sp>
-      <p:sp>
-        <p:nvSpPr>
-          <p:cNvPr id="4" name="Segnaposto numero diapositiva 3"/>
-          <p:cNvSpPr>
-            <a:spLocks noGrp="1"/>
-          </p:cNvSpPr>
-          <p:nvPr>
-            <p:ph type="sldNum" sz="quarter" idx="10"/>
-          </p:nvPr>
-        </p:nvSpPr>
-        <p:spPr/>
-        <p:txBody>
-          <a:bodyPr/>
-          <a:lstStyle/>
-          <a:p>
-            <a:fld id="{B38CEA09-33FA-4F6C-9D30-5FB0AA0E11C3}" type="slidenum">
-              <a:rPr lang="it-IT" smtClean="0"/>
-              <a:t>71</a:t>
-            </a:fld>
-            <a:endParaRPr lang="it-IT"/>
-          </a:p>
-        </p:txBody>
-      </p:sp>
     </p:spTree>
     <p:extLst>
       <p:ext uri="{BB962C8B-B14F-4D97-AF65-F5344CB8AC3E}">
@@ -2584,29 +2242,6 @@
               <a:rPr lang="en-US" dirty="0"/>
               <a:t>https://developer.ibm.com/dwblog/2017/detecting-complex-fraud-real-time-graph-databases/</a:t>
             </a:r>
-          </a:p>
-        </p:txBody>
-      </p:sp>
-      <p:sp>
-        <p:nvSpPr>
-          <p:cNvPr id="4" name="Segnaposto numero diapositiva 3"/>
-          <p:cNvSpPr>
-            <a:spLocks noGrp="1"/>
-          </p:cNvSpPr>
-          <p:nvPr>
-            <p:ph type="sldNum" sz="quarter" idx="10"/>
-          </p:nvPr>
-        </p:nvSpPr>
-        <p:spPr/>
-        <p:txBody>
-          <a:bodyPr/>
-          <a:lstStyle/>
-          <a:p>
-            <a:fld id="{B38CEA09-33FA-4F6C-9D30-5FB0AA0E11C3}" type="slidenum">
-              <a:rPr lang="it-IT" smtClean="0"/>
-              <a:t>74</a:t>
-            </a:fld>
-            <a:endParaRPr lang="it-IT"/>
           </a:p>
         </p:txBody>
       </p:sp>
@@ -2671,29 +2306,6 @@
           </a:p>
         </p:txBody>
       </p:sp>
-      <p:sp>
-        <p:nvSpPr>
-          <p:cNvPr id="4" name="Segnaposto numero diapositiva 3"/>
-          <p:cNvSpPr>
-            <a:spLocks noGrp="1"/>
-          </p:cNvSpPr>
-          <p:nvPr>
-            <p:ph type="sldNum" sz="quarter" idx="10"/>
-          </p:nvPr>
-        </p:nvSpPr>
-        <p:spPr/>
-        <p:txBody>
-          <a:bodyPr/>
-          <a:lstStyle/>
-          <a:p>
-            <a:fld id="{B38CEA09-33FA-4F6C-9D30-5FB0AA0E11C3}" type="slidenum">
-              <a:rPr lang="it-IT" smtClean="0"/>
-              <a:t>75</a:t>
-            </a:fld>
-            <a:endParaRPr lang="it-IT"/>
-          </a:p>
-        </p:txBody>
-      </p:sp>
     </p:spTree>
     <p:extLst>
       <p:ext uri="{BB962C8B-B14F-4D97-AF65-F5344CB8AC3E}">
@@ -2783,29 +2395,6 @@
               <a:rPr lang="en-US" dirty="0"/>
               <a:t>"</a:t>
             </a:r>
-          </a:p>
-        </p:txBody>
-      </p:sp>
-      <p:sp>
-        <p:nvSpPr>
-          <p:cNvPr id="4" name="Segnaposto numero diapositiva 3"/>
-          <p:cNvSpPr>
-            <a:spLocks noGrp="1"/>
-          </p:cNvSpPr>
-          <p:nvPr>
-            <p:ph type="sldNum" sz="quarter" idx="10"/>
-          </p:nvPr>
-        </p:nvSpPr>
-        <p:spPr/>
-        <p:txBody>
-          <a:bodyPr/>
-          <a:lstStyle/>
-          <a:p>
-            <a:fld id="{B38CEA09-33FA-4F6C-9D30-5FB0AA0E11C3}" type="slidenum">
-              <a:rPr lang="it-IT" smtClean="0"/>
-              <a:t>76</a:t>
-            </a:fld>
-            <a:endParaRPr lang="it-IT"/>
           </a:p>
         </p:txBody>
       </p:sp>
@@ -2951,29 +2540,6 @@
           </a:p>
         </p:txBody>
       </p:sp>
-      <p:sp>
-        <p:nvSpPr>
-          <p:cNvPr id="4" name="Segnaposto numero diapositiva 3"/>
-          <p:cNvSpPr>
-            <a:spLocks noGrp="1"/>
-          </p:cNvSpPr>
-          <p:nvPr>
-            <p:ph type="sldNum" sz="quarter" idx="10"/>
-          </p:nvPr>
-        </p:nvSpPr>
-        <p:spPr/>
-        <p:txBody>
-          <a:bodyPr/>
-          <a:lstStyle/>
-          <a:p>
-            <a:fld id="{B38CEA09-33FA-4F6C-9D30-5FB0AA0E11C3}" type="slidenum">
-              <a:rPr lang="it-IT" smtClean="0"/>
-              <a:t>78</a:t>
-            </a:fld>
-            <a:endParaRPr lang="it-IT"/>
-          </a:p>
-        </p:txBody>
-      </p:sp>
     </p:spTree>
     <p:extLst>
       <p:ext uri="{BB962C8B-B14F-4D97-AF65-F5344CB8AC3E}">
@@ -3196,29 +2762,6 @@
           </a:p>
           <a:p>
             <a:endParaRPr lang="it-IT" dirty="0"/>
-          </a:p>
-        </p:txBody>
-      </p:sp>
-      <p:sp>
-        <p:nvSpPr>
-          <p:cNvPr id="4" name="Segnaposto numero diapositiva 3"/>
-          <p:cNvSpPr>
-            <a:spLocks noGrp="1"/>
-          </p:cNvSpPr>
-          <p:nvPr>
-            <p:ph type="sldNum" sz="quarter" idx="10"/>
-          </p:nvPr>
-        </p:nvSpPr>
-        <p:spPr/>
-        <p:txBody>
-          <a:bodyPr/>
-          <a:lstStyle/>
-          <a:p>
-            <a:fld id="{B38CEA09-33FA-4F6C-9D30-5FB0AA0E11C3}" type="slidenum">
-              <a:rPr lang="it-IT" smtClean="0"/>
-              <a:t>79</a:t>
-            </a:fld>
-            <a:endParaRPr lang="it-IT"/>
           </a:p>
         </p:txBody>
       </p:sp>
@@ -3283,29 +2826,6 @@
           </a:p>
         </p:txBody>
       </p:sp>
-      <p:sp>
-        <p:nvSpPr>
-          <p:cNvPr id="4" name="Segnaposto numero diapositiva 3"/>
-          <p:cNvSpPr>
-            <a:spLocks noGrp="1"/>
-          </p:cNvSpPr>
-          <p:nvPr>
-            <p:ph type="sldNum" sz="quarter" idx="10"/>
-          </p:nvPr>
-        </p:nvSpPr>
-        <p:spPr/>
-        <p:txBody>
-          <a:bodyPr/>
-          <a:lstStyle/>
-          <a:p>
-            <a:fld id="{B38CEA09-33FA-4F6C-9D30-5FB0AA0E11C3}" type="slidenum">
-              <a:rPr lang="it-IT" smtClean="0"/>
-              <a:t>80</a:t>
-            </a:fld>
-            <a:endParaRPr lang="it-IT"/>
-          </a:p>
-        </p:txBody>
-      </p:sp>
     </p:spTree>
     <p:extLst>
       <p:ext uri="{BB962C8B-B14F-4D97-AF65-F5344CB8AC3E}">
@@ -3375,29 +2895,6 @@
               <a:t>While doing this, we need to update the indexed data as the data in the application database changes. The process of updating the data can be real-time or batch, as long as we ensure that the application can deal with stale data in the index/search engine. The event sourcing (“ Event Sourcing,” p. 142) pattern can be used to update the index.</a:t>
             </a:r>
             <a:endParaRPr lang="it-IT" dirty="0"/>
-          </a:p>
-        </p:txBody>
-      </p:sp>
-      <p:sp>
-        <p:nvSpPr>
-          <p:cNvPr id="4" name="Segnaposto numero diapositiva 3"/>
-          <p:cNvSpPr>
-            <a:spLocks noGrp="1"/>
-          </p:cNvSpPr>
-          <p:nvPr>
-            <p:ph type="sldNum" sz="quarter" idx="10"/>
-          </p:nvPr>
-        </p:nvSpPr>
-        <p:spPr/>
-        <p:txBody>
-          <a:bodyPr/>
-          <a:lstStyle/>
-          <a:p>
-            <a:fld id="{B38CEA09-33FA-4F6C-9D30-5FB0AA0E11C3}" type="slidenum">
-              <a:rPr lang="it-IT" smtClean="0"/>
-              <a:t>81</a:t>
-            </a:fld>
-            <a:endParaRPr lang="it-IT"/>
           </a:p>
         </p:txBody>
       </p:sp>
@@ -3473,29 +2970,6 @@
           </a:p>
         </p:txBody>
       </p:sp>
-      <p:sp>
-        <p:nvSpPr>
-          <p:cNvPr id="4" name="Segnaposto numero diapositiva 3"/>
-          <p:cNvSpPr>
-            <a:spLocks noGrp="1"/>
-          </p:cNvSpPr>
-          <p:nvPr>
-            <p:ph type="sldNum" sz="quarter" idx="10"/>
-          </p:nvPr>
-        </p:nvSpPr>
-        <p:spPr/>
-        <p:txBody>
-          <a:bodyPr/>
-          <a:lstStyle/>
-          <a:p>
-            <a:fld id="{B38CEA09-33FA-4F6C-9D30-5FB0AA0E11C3}" type="slidenum">
-              <a:rPr lang="it-IT" smtClean="0"/>
-              <a:t>8</a:t>
-            </a:fld>
-            <a:endParaRPr lang="it-IT"/>
-          </a:p>
-        </p:txBody>
-      </p:sp>
     </p:spTree>
     <p:extLst>
       <p:ext uri="{BB962C8B-B14F-4D97-AF65-F5344CB8AC3E}">
@@ -3557,29 +3031,6 @@
               <a:rPr lang="it-IT" dirty="0"/>
               <a:t>Persistenza poliglotta</a:t>
             </a:r>
-          </a:p>
-        </p:txBody>
-      </p:sp>
-      <p:sp>
-        <p:nvSpPr>
-          <p:cNvPr id="4" name="Segnaposto numero diapositiva 3"/>
-          <p:cNvSpPr>
-            <a:spLocks noGrp="1"/>
-          </p:cNvSpPr>
-          <p:nvPr>
-            <p:ph type="sldNum" sz="quarter" idx="10"/>
-          </p:nvPr>
-        </p:nvSpPr>
-        <p:spPr/>
-        <p:txBody>
-          <a:bodyPr/>
-          <a:lstStyle/>
-          <a:p>
-            <a:fld id="{B38CEA09-33FA-4F6C-9D30-5FB0AA0E11C3}" type="slidenum">
-              <a:rPr lang="it-IT" smtClean="0"/>
-              <a:t>82</a:t>
-            </a:fld>
-            <a:endParaRPr lang="it-IT"/>
           </a:p>
         </p:txBody>
       </p:sp>
@@ -3647,29 +3098,6 @@
           </a:p>
         </p:txBody>
       </p:sp>
-      <p:sp>
-        <p:nvSpPr>
-          <p:cNvPr id="4" name="Segnaposto numero diapositiva 3"/>
-          <p:cNvSpPr>
-            <a:spLocks noGrp="1"/>
-          </p:cNvSpPr>
-          <p:nvPr>
-            <p:ph type="sldNum" sz="quarter" idx="10"/>
-          </p:nvPr>
-        </p:nvSpPr>
-        <p:spPr/>
-        <p:txBody>
-          <a:bodyPr/>
-          <a:lstStyle/>
-          <a:p>
-            <a:fld id="{B38CEA09-33FA-4F6C-9D30-5FB0AA0E11C3}" type="slidenum">
-              <a:rPr lang="it-IT" smtClean="0"/>
-              <a:t>19</a:t>
-            </a:fld>
-            <a:endParaRPr lang="it-IT"/>
-          </a:p>
-        </p:txBody>
-      </p:sp>
     </p:spTree>
     <p:extLst>
       <p:ext uri="{BB962C8B-B14F-4D97-AF65-F5344CB8AC3E}">
@@ -3728,29 +3156,6 @@
           <a:lstStyle/>
           <a:p>
             <a:endParaRPr lang="en-US" dirty="0"/>
-          </a:p>
-        </p:txBody>
-      </p:sp>
-      <p:sp>
-        <p:nvSpPr>
-          <p:cNvPr id="4" name="Segnaposto numero diapositiva 3"/>
-          <p:cNvSpPr>
-            <a:spLocks noGrp="1"/>
-          </p:cNvSpPr>
-          <p:nvPr>
-            <p:ph type="sldNum" sz="quarter" idx="10"/>
-          </p:nvPr>
-        </p:nvSpPr>
-        <p:spPr/>
-        <p:txBody>
-          <a:bodyPr/>
-          <a:lstStyle/>
-          <a:p>
-            <a:fld id="{B38CEA09-33FA-4F6C-9D30-5FB0AA0E11C3}" type="slidenum">
-              <a:rPr lang="it-IT" smtClean="0"/>
-              <a:t>24</a:t>
-            </a:fld>
-            <a:endParaRPr lang="it-IT"/>
           </a:p>
         </p:txBody>
       </p:sp>
@@ -3815,29 +3220,6 @@
           </a:p>
         </p:txBody>
       </p:sp>
-      <p:sp>
-        <p:nvSpPr>
-          <p:cNvPr id="4" name="Segnaposto numero diapositiva 3"/>
-          <p:cNvSpPr>
-            <a:spLocks noGrp="1"/>
-          </p:cNvSpPr>
-          <p:nvPr>
-            <p:ph type="sldNum" sz="quarter" idx="10"/>
-          </p:nvPr>
-        </p:nvSpPr>
-        <p:spPr/>
-        <p:txBody>
-          <a:bodyPr/>
-          <a:lstStyle/>
-          <a:p>
-            <a:fld id="{B38CEA09-33FA-4F6C-9D30-5FB0AA0E11C3}" type="slidenum">
-              <a:rPr lang="it-IT" smtClean="0"/>
-              <a:t>30</a:t>
-            </a:fld>
-            <a:endParaRPr lang="it-IT"/>
-          </a:p>
-        </p:txBody>
-      </p:sp>
     </p:spTree>
     <p:extLst>
       <p:ext uri="{BB962C8B-B14F-4D97-AF65-F5344CB8AC3E}">
@@ -3946,29 +3328,6 @@
               <a:t>with scaling out because the aggregate is a natural unit to use for distribution.</a:t>
             </a:r>
             <a:endParaRPr lang="it-IT" dirty="0"/>
-          </a:p>
-        </p:txBody>
-      </p:sp>
-      <p:sp>
-        <p:nvSpPr>
-          <p:cNvPr id="4" name="Segnaposto numero diapositiva 3"/>
-          <p:cNvSpPr>
-            <a:spLocks noGrp="1"/>
-          </p:cNvSpPr>
-          <p:nvPr>
-            <p:ph type="sldNum" sz="quarter" idx="10"/>
-          </p:nvPr>
-        </p:nvSpPr>
-        <p:spPr/>
-        <p:txBody>
-          <a:bodyPr/>
-          <a:lstStyle/>
-          <a:p>
-            <a:fld id="{B38CEA09-33FA-4F6C-9D30-5FB0AA0E11C3}" type="slidenum">
-              <a:rPr lang="it-IT" smtClean="0"/>
-              <a:t>33</a:t>
-            </a:fld>
-            <a:endParaRPr lang="it-IT"/>
           </a:p>
         </p:txBody>
       </p:sp>
@@ -4033,29 +3392,6 @@
           </a:p>
         </p:txBody>
       </p:sp>
-      <p:sp>
-        <p:nvSpPr>
-          <p:cNvPr id="4" name="Segnaposto numero diapositiva 3"/>
-          <p:cNvSpPr>
-            <a:spLocks noGrp="1"/>
-          </p:cNvSpPr>
-          <p:nvPr>
-            <p:ph type="sldNum" sz="quarter" idx="10"/>
-          </p:nvPr>
-        </p:nvSpPr>
-        <p:spPr/>
-        <p:txBody>
-          <a:bodyPr/>
-          <a:lstStyle/>
-          <a:p>
-            <a:fld id="{B38CEA09-33FA-4F6C-9D30-5FB0AA0E11C3}" type="slidenum">
-              <a:rPr lang="it-IT" smtClean="0"/>
-              <a:t>34</a:t>
-            </a:fld>
-            <a:endParaRPr lang="it-IT"/>
-          </a:p>
-        </p:txBody>
-      </p:sp>
     </p:spTree>
     <p:extLst>
       <p:ext uri="{BB962C8B-B14F-4D97-AF65-F5344CB8AC3E}">
@@ -4174,29 +3510,6 @@
           </a:p>
           <a:p>
             <a:endParaRPr lang="it-IT" dirty="0"/>
-          </a:p>
-        </p:txBody>
-      </p:sp>
-      <p:sp>
-        <p:nvSpPr>
-          <p:cNvPr id="4" name="Segnaposto numero diapositiva 3"/>
-          <p:cNvSpPr>
-            <a:spLocks noGrp="1"/>
-          </p:cNvSpPr>
-          <p:nvPr>
-            <p:ph type="sldNum" sz="quarter" idx="10"/>
-          </p:nvPr>
-        </p:nvSpPr>
-        <p:spPr/>
-        <p:txBody>
-          <a:bodyPr/>
-          <a:lstStyle/>
-          <a:p>
-            <a:fld id="{B38CEA09-33FA-4F6C-9D30-5FB0AA0E11C3}" type="slidenum">
-              <a:rPr lang="it-IT" smtClean="0"/>
-              <a:t>36</a:t>
-            </a:fld>
-            <a:endParaRPr lang="it-IT"/>
           </a:p>
         </p:txBody>
       </p:sp>
@@ -5327,7 +4640,7 @@
           <a:p>
             <a:fld id="{5DD6F1BA-2510-46FC-9346-AB1F3CA1593B}" type="slidenum">
               <a:rPr lang="it-IT" smtClean="0"/>
-              <a:t>‹#›</a:t>
+              <a:t>‹N›</a:t>
             </a:fld>
             <a:endParaRPr lang="it-IT"/>
           </a:p>
@@ -5819,7 +5132,7 @@
             <a:pPr lvl="0" algn="l"/>
             <a:r>
               <a:rPr lang="it-IT" dirty="0"/>
-              <a:t>Matteo Francia – University of Bologna</a:t>
+              <a:t>Chiara Forresi – University of Bologna</a:t>
             </a:r>
           </a:p>
         </p:txBody>
@@ -5950,7 +5263,7 @@
             <a:fld id="{190FD6C2-E3ED-40C5-8699-39D0C34FA95B}" type="slidenum">
               <a:rPr lang="en-US" smtClean="0"/>
               <a:pPr/>
-              <a:t>‹#›</a:t>
+              <a:t>‹N›</a:t>
             </a:fld>
             <a:endParaRPr lang="en-US" dirty="0"/>
           </a:p>
@@ -5974,7 +5287,7 @@
     <p:sldLayoutId id="2147483655" r:id="rId7"/>
     <p:sldLayoutId id="2147483661" r:id="rId8"/>
   </p:sldLayoutIdLst>
-  <p:hf hdr="0" dt="0"/>
+  <p:hf sldNum="0" hdr="0" ftr="0" dt="0"/>
   <p:txStyles>
     <p:titleStyle>
       <a:lvl1pPr algn="l" defTabSz="914400" rtl="0" eaLnBrk="1" latinLnBrk="0" hangingPunct="1">
@@ -6291,12 +5604,7 @@
             <p:ph type="subTitle" idx="1"/>
           </p:nvPr>
         </p:nvSpPr>
-        <p:spPr>
-          <a:xfrm>
-            <a:off x="1524000" y="3612590"/>
-            <a:ext cx="9144000" cy="1655762"/>
-          </a:xfrm>
-        </p:spPr>
+        <p:spPr/>
         <p:txBody>
           <a:bodyPr anchor="ctr"/>
           <a:lstStyle/>
@@ -6318,12 +5626,7 @@
             <p:ph type="title"/>
           </p:nvPr>
         </p:nvSpPr>
-        <p:spPr>
-          <a:xfrm>
-            <a:off x="1524000" y="2271199"/>
-            <a:ext cx="9144000" cy="1325563"/>
-          </a:xfrm>
-        </p:spPr>
+        <p:spPr/>
         <p:txBody>
           <a:bodyPr anchor="b">
             <a:normAutofit/>
@@ -10663,14 +9966,10 @@
           <a:lstStyle/>
           <a:p>
             <a:r>
-              <a:rPr lang="it-IT" dirty="0" err="1">
-                <a:latin typeface="Consolas" panose="020B0609020204030204" pitchFamily="49" charset="0"/>
-              </a:rPr>
+              <a:rPr lang="it-IT" dirty="0" err="1"/>
               <a:t>whoami</a:t>
             </a:r>
-            <a:endParaRPr lang="en-US" dirty="0">
-              <a:latin typeface="Consolas" panose="020B0609020204030204" pitchFamily="49" charset="0"/>
-            </a:endParaRPr>
+            <a:endParaRPr lang="en-US" dirty="0"/>
           </a:p>
         </p:txBody>
       </p:sp>
@@ -10697,7 +9996,7 @@
           <a:p>
             <a:r>
               <a:rPr lang="en-US" dirty="0"/>
-              <a:t>Matteo Francia, Ph.D.</a:t>
+              <a:t>Chiara Forresi</a:t>
             </a:r>
           </a:p>
           <a:p>
@@ -10710,7 +10009,7 @@
               <a:rPr lang="en-US" dirty="0">
                 <a:hlinkClick r:id="rId2"/>
               </a:rPr>
-              <a:t>m.francia@unibo.it</a:t>
+              <a:t>chiara.forresi@unibo.it</a:t>
             </a:r>
             <a:endParaRPr lang="en-US" dirty="0"/>
           </a:p>
@@ -10718,7 +10017,15 @@
             <a:pPr lvl="1"/>
             <a:r>
               <a:rPr lang="en-US" dirty="0"/>
-              <a:t>Research fellow @ </a:t>
+              <a:t>3</a:t>
+            </a:r>
+            <a:r>
+              <a:rPr lang="en-US" baseline="30000" dirty="0"/>
+              <a:t>rd</a:t>
+            </a:r>
+            <a:r>
+              <a:rPr lang="en-US" dirty="0"/>
+              <a:t> year Ph.D. Candidate in Data Science and Computation @ </a:t>
             </a:r>
             <a:r>
               <a:rPr lang="en-US" dirty="0" err="1"/>
@@ -10743,7 +10050,7 @@
             <a:pPr lvl="1"/>
             <a:r>
               <a:rPr lang="en-US" dirty="0"/>
-              <a:t>Geo-spatial analytics</a:t>
+              <a:t>Streaming data</a:t>
             </a:r>
           </a:p>
         </p:txBody>
@@ -20507,36 +19814,6 @@
           </a:p>
         </p:txBody>
       </p:sp>
-      <p:sp>
-        <p:nvSpPr>
-          <p:cNvPr id="4" name="Segnaposto numero diapositiva 3"/>
-          <p:cNvSpPr>
-            <a:spLocks noGrp="1"/>
-          </p:cNvSpPr>
-          <p:nvPr>
-            <p:ph type="sldNum" sz="quarter" idx="4294967295"/>
-          </p:nvPr>
-        </p:nvSpPr>
-        <p:spPr>
-          <a:xfrm>
-            <a:off x="9448800" y="6492874"/>
-            <a:ext cx="2743200" cy="365125"/>
-          </a:xfrm>
-          <a:prstGeom prst="rect">
-            <a:avLst/>
-          </a:prstGeom>
-        </p:spPr>
-        <p:txBody>
-          <a:bodyPr/>
-          <a:lstStyle/>
-          <a:p>
-            <a:pPr>
-              <a:defRPr/>
-            </a:pPr>
-            <a:endParaRPr lang="it-IT" dirty="0"/>
-          </a:p>
-        </p:txBody>
-      </p:sp>
     </p:spTree>
     <p:extLst>
       <p:ext uri="{BB962C8B-B14F-4D97-AF65-F5344CB8AC3E}">
@@ -20830,36 +20107,6 @@
           </a:p>
         </p:txBody>
       </p:sp>
-      <p:sp>
-        <p:nvSpPr>
-          <p:cNvPr id="4" name="Segnaposto numero diapositiva 3"/>
-          <p:cNvSpPr>
-            <a:spLocks noGrp="1"/>
-          </p:cNvSpPr>
-          <p:nvPr>
-            <p:ph type="sldNum" sz="quarter" idx="4294967295"/>
-          </p:nvPr>
-        </p:nvSpPr>
-        <p:spPr>
-          <a:xfrm>
-            <a:off x="9448800" y="6492874"/>
-            <a:ext cx="2743200" cy="365125"/>
-          </a:xfrm>
-          <a:prstGeom prst="rect">
-            <a:avLst/>
-          </a:prstGeom>
-        </p:spPr>
-        <p:txBody>
-          <a:bodyPr/>
-          <a:lstStyle/>
-          <a:p>
-            <a:pPr>
-              <a:defRPr/>
-            </a:pPr>
-            <a:endParaRPr lang="it-IT" dirty="0"/>
-          </a:p>
-        </p:txBody>
-      </p:sp>
     </p:spTree>
     <p:extLst>
       <p:ext uri="{BB962C8B-B14F-4D97-AF65-F5344CB8AC3E}">
@@ -21183,33 +20430,6 @@
           <a:p>
             <a:pPr lvl="1"/>
             <a:endParaRPr lang="it-IT" noProof="0" dirty="0"/>
-          </a:p>
-        </p:txBody>
-      </p:sp>
-      <p:sp>
-        <p:nvSpPr>
-          <p:cNvPr id="4" name="Segnaposto numero diapositiva 3"/>
-          <p:cNvSpPr>
-            <a:spLocks noGrp="1"/>
-          </p:cNvSpPr>
-          <p:nvPr>
-            <p:ph type="sldNum" sz="quarter" idx="4294967295"/>
-          </p:nvPr>
-        </p:nvSpPr>
-        <p:spPr>
-          <a:xfrm>
-            <a:off x="9448800" y="6492874"/>
-            <a:ext cx="2743200" cy="365125"/>
-          </a:xfrm>
-          <a:prstGeom prst="rect">
-            <a:avLst/>
-          </a:prstGeom>
-        </p:spPr>
-        <p:txBody>
-          <a:bodyPr/>
-          <a:lstStyle/>
-          <a:p>
-            <a:endParaRPr lang="en-US" dirty="0"/>
           </a:p>
         </p:txBody>
       </p:sp>
@@ -21587,36 +20807,6 @@
               <a:rPr lang="it-IT" noProof="0" dirty="0"/>
               <a:t>Stesso cliente, stesso nodo</a:t>
             </a:r>
-          </a:p>
-        </p:txBody>
-      </p:sp>
-      <p:sp>
-        <p:nvSpPr>
-          <p:cNvPr id="4" name="Segnaposto numero diapositiva 3"/>
-          <p:cNvSpPr>
-            <a:spLocks noGrp="1"/>
-          </p:cNvSpPr>
-          <p:nvPr>
-            <p:ph type="sldNum" sz="quarter" idx="4294967295"/>
-          </p:nvPr>
-        </p:nvSpPr>
-        <p:spPr>
-          <a:xfrm>
-            <a:off x="9448800" y="6492874"/>
-            <a:ext cx="2743200" cy="365125"/>
-          </a:xfrm>
-          <a:prstGeom prst="rect">
-            <a:avLst/>
-          </a:prstGeom>
-        </p:spPr>
-        <p:txBody>
-          <a:bodyPr/>
-          <a:lstStyle/>
-          <a:p>
-            <a:pPr>
-              <a:defRPr/>
-            </a:pPr>
-            <a:endParaRPr lang="it-IT" dirty="0"/>
           </a:p>
         </p:txBody>
       </p:sp>
@@ -21991,36 +21181,6 @@
           </a:p>
         </p:txBody>
       </p:sp>
-      <p:sp>
-        <p:nvSpPr>
-          <p:cNvPr id="3" name="Segnaposto numero diapositiva 2"/>
-          <p:cNvSpPr>
-            <a:spLocks noGrp="1"/>
-          </p:cNvSpPr>
-          <p:nvPr>
-            <p:ph type="sldNum" sz="quarter" idx="4294967295"/>
-          </p:nvPr>
-        </p:nvSpPr>
-        <p:spPr>
-          <a:xfrm>
-            <a:off x="9448800" y="6492874"/>
-            <a:ext cx="2743200" cy="365125"/>
-          </a:xfrm>
-          <a:prstGeom prst="rect">
-            <a:avLst/>
-          </a:prstGeom>
-        </p:spPr>
-        <p:txBody>
-          <a:bodyPr/>
-          <a:lstStyle/>
-          <a:p>
-            <a:pPr>
-              <a:defRPr/>
-            </a:pPr>
-            <a:endParaRPr lang="it-IT" dirty="0"/>
-          </a:p>
-        </p:txBody>
-      </p:sp>
     </p:spTree>
     <p:extLst>
       <p:ext uri="{BB962C8B-B14F-4D97-AF65-F5344CB8AC3E}">
@@ -22824,36 +21984,6 @@
               </a:rPr>
               <a:t>Non ideale in presenza di un forte carico di lavoro in scrittura</a:t>
             </a:r>
-          </a:p>
-        </p:txBody>
-      </p:sp>
-      <p:sp>
-        <p:nvSpPr>
-          <p:cNvPr id="4" name="Segnaposto numero diapositiva 3"/>
-          <p:cNvSpPr>
-            <a:spLocks noGrp="1"/>
-          </p:cNvSpPr>
-          <p:nvPr>
-            <p:ph type="sldNum" sz="quarter" idx="4294967295"/>
-          </p:nvPr>
-        </p:nvSpPr>
-        <p:spPr>
-          <a:xfrm>
-            <a:off x="9448800" y="6492874"/>
-            <a:ext cx="2743200" cy="365125"/>
-          </a:xfrm>
-          <a:prstGeom prst="rect">
-            <a:avLst/>
-          </a:prstGeom>
-        </p:spPr>
-        <p:txBody>
-          <a:bodyPr/>
-          <a:lstStyle/>
-          <a:p>
-            <a:pPr>
-              <a:defRPr/>
-            </a:pPr>
-            <a:endParaRPr lang="it-IT" dirty="0"/>
           </a:p>
         </p:txBody>
       </p:sp>
@@ -23231,36 +22361,6 @@
           </a:p>
         </p:txBody>
       </p:sp>
-      <p:sp>
-        <p:nvSpPr>
-          <p:cNvPr id="4" name="Segnaposto numero diapositiva 3"/>
-          <p:cNvSpPr>
-            <a:spLocks noGrp="1"/>
-          </p:cNvSpPr>
-          <p:nvPr>
-            <p:ph type="sldNum" sz="quarter" idx="4294967295"/>
-          </p:nvPr>
-        </p:nvSpPr>
-        <p:spPr>
-          <a:xfrm>
-            <a:off x="9448800" y="6492874"/>
-            <a:ext cx="2743200" cy="365125"/>
-          </a:xfrm>
-          <a:prstGeom prst="rect">
-            <a:avLst/>
-          </a:prstGeom>
-        </p:spPr>
-        <p:txBody>
-          <a:bodyPr/>
-          <a:lstStyle/>
-          <a:p>
-            <a:pPr>
-              <a:defRPr/>
-            </a:pPr>
-            <a:endParaRPr lang="it-IT" dirty="0"/>
-          </a:p>
-        </p:txBody>
-      </p:sp>
     </p:spTree>
     <p:extLst>
       <p:ext uri="{BB962C8B-B14F-4D97-AF65-F5344CB8AC3E}">
@@ -23526,36 +22626,6 @@
               <a:t>Consistenza con replicazione: gestire i conflitti</a:t>
             </a:r>
             <a:endParaRPr lang="it-IT" noProof="0" dirty="0"/>
-          </a:p>
-        </p:txBody>
-      </p:sp>
-      <p:sp>
-        <p:nvSpPr>
-          <p:cNvPr id="3" name="Segnaposto numero diapositiva 2"/>
-          <p:cNvSpPr>
-            <a:spLocks noGrp="1"/>
-          </p:cNvSpPr>
-          <p:nvPr>
-            <p:ph type="sldNum" sz="quarter" idx="4294967295"/>
-          </p:nvPr>
-        </p:nvSpPr>
-        <p:spPr>
-          <a:xfrm>
-            <a:off x="9448800" y="6492874"/>
-            <a:ext cx="2743200" cy="365125"/>
-          </a:xfrm>
-          <a:prstGeom prst="rect">
-            <a:avLst/>
-          </a:prstGeom>
-        </p:spPr>
-        <p:txBody>
-          <a:bodyPr/>
-          <a:lstStyle/>
-          <a:p>
-            <a:pPr>
-              <a:defRPr/>
-            </a:pPr>
-            <a:endParaRPr lang="it-IT" dirty="0"/>
           </a:p>
         </p:txBody>
       </p:sp>
@@ -23623,36 +22693,6 @@
               <a:t>uorum</a:t>
             </a:r>
             <a:endParaRPr lang="it-IT" noProof="0" dirty="0"/>
-          </a:p>
-        </p:txBody>
-      </p:sp>
-      <p:sp>
-        <p:nvSpPr>
-          <p:cNvPr id="3" name="Segnaposto numero diapositiva 2"/>
-          <p:cNvSpPr>
-            <a:spLocks noGrp="1"/>
-          </p:cNvSpPr>
-          <p:nvPr>
-            <p:ph type="sldNum" sz="quarter" idx="4294967295"/>
-          </p:nvPr>
-        </p:nvSpPr>
-        <p:spPr>
-          <a:xfrm>
-            <a:off x="9448800" y="6492874"/>
-            <a:ext cx="2743200" cy="365125"/>
-          </a:xfrm>
-          <a:prstGeom prst="rect">
-            <a:avLst/>
-          </a:prstGeom>
-        </p:spPr>
-        <p:txBody>
-          <a:bodyPr/>
-          <a:lstStyle/>
-          <a:p>
-            <a:pPr>
-              <a:defRPr/>
-            </a:pPr>
-            <a:endParaRPr lang="it-IT" dirty="0"/>
           </a:p>
         </p:txBody>
       </p:sp>
@@ -27345,43 +26385,6 @@
               <a:t>: soluzioni</a:t>
             </a:r>
             <a:endParaRPr lang="it-IT" noProof="0" dirty="0"/>
-          </a:p>
-        </p:txBody>
-      </p:sp>
-      <p:sp>
-        <p:nvSpPr>
-          <p:cNvPr id="3" name="Segnaposto numero diapositiva 2"/>
-          <p:cNvSpPr>
-            <a:spLocks noGrp="1"/>
-          </p:cNvSpPr>
-          <p:nvPr>
-            <p:ph type="sldNum" sz="quarter" idx="4294967295"/>
-          </p:nvPr>
-        </p:nvSpPr>
-        <p:spPr>
-          <a:xfrm>
-            <a:off x="8949345" y="6459787"/>
-            <a:ext cx="984019" cy="365125"/>
-          </a:xfrm>
-          <a:prstGeom prst="rect">
-            <a:avLst/>
-          </a:prstGeom>
-        </p:spPr>
-        <p:txBody>
-          <a:bodyPr/>
-          <a:lstStyle/>
-          <a:p>
-            <a:pPr>
-              <a:defRPr/>
-            </a:pPr>
-            <a:fld id="{3D0CCE87-1B0E-4A52-BA2E-4B6B74896E37}" type="slidenum">
-              <a:rPr lang="it-IT" smtClean="0"/>
-              <a:pPr>
-                <a:defRPr/>
-              </a:pPr>
-              <a:t>57</a:t>
-            </a:fld>
-            <a:endParaRPr lang="it-IT"/>
           </a:p>
         </p:txBody>
       </p:sp>
@@ -28701,36 +27704,6 @@
       </p:sp>
       <p:sp>
         <p:nvSpPr>
-          <p:cNvPr id="3" name="Segnaposto numero diapositiva 2"/>
-          <p:cNvSpPr>
-            <a:spLocks noGrp="1"/>
-          </p:cNvSpPr>
-          <p:nvPr>
-            <p:ph type="sldNum" sz="quarter" idx="4294967295"/>
-          </p:nvPr>
-        </p:nvSpPr>
-        <p:spPr>
-          <a:xfrm>
-            <a:off x="9448800" y="6492874"/>
-            <a:ext cx="2743200" cy="365125"/>
-          </a:xfrm>
-          <a:prstGeom prst="rect">
-            <a:avLst/>
-          </a:prstGeom>
-        </p:spPr>
-        <p:txBody>
-          <a:bodyPr/>
-          <a:lstStyle/>
-          <a:p>
-            <a:pPr>
-              <a:defRPr/>
-            </a:pPr>
-            <a:endParaRPr lang="it-IT" dirty="0"/>
-          </a:p>
-        </p:txBody>
-      </p:sp>
-      <p:sp>
-        <p:nvSpPr>
           <p:cNvPr id="4" name="Segnaposto contenuto 3"/>
           <p:cNvSpPr>
             <a:spLocks noGrp="1"/>
@@ -29041,36 +28014,6 @@
       </p:sp>
       <p:sp>
         <p:nvSpPr>
-          <p:cNvPr id="3" name="Segnaposto numero diapositiva 2"/>
-          <p:cNvSpPr>
-            <a:spLocks noGrp="1"/>
-          </p:cNvSpPr>
-          <p:nvPr>
-            <p:ph type="sldNum" sz="quarter" idx="4294967295"/>
-          </p:nvPr>
-        </p:nvSpPr>
-        <p:spPr>
-          <a:xfrm>
-            <a:off x="9448800" y="6492874"/>
-            <a:ext cx="2743200" cy="365125"/>
-          </a:xfrm>
-          <a:prstGeom prst="rect">
-            <a:avLst/>
-          </a:prstGeom>
-        </p:spPr>
-        <p:txBody>
-          <a:bodyPr/>
-          <a:lstStyle/>
-          <a:p>
-            <a:pPr>
-              <a:defRPr/>
-            </a:pPr>
-            <a:endParaRPr lang="it-IT" dirty="0"/>
-          </a:p>
-        </p:txBody>
-      </p:sp>
-      <p:sp>
-        <p:nvSpPr>
           <p:cNvPr id="4" name="Segnaposto contenuto 3"/>
           <p:cNvSpPr>
             <a:spLocks noGrp="1"/>
@@ -29347,36 +28290,6 @@
               <a:rPr lang="it-IT" noProof="0" dirty="0"/>
               <a:t>-Value: casi d'uso reali</a:t>
             </a:r>
-          </a:p>
-        </p:txBody>
-      </p:sp>
-      <p:sp>
-        <p:nvSpPr>
-          <p:cNvPr id="3" name="Segnaposto numero diapositiva 2"/>
-          <p:cNvSpPr>
-            <a:spLocks noGrp="1"/>
-          </p:cNvSpPr>
-          <p:nvPr>
-            <p:ph type="sldNum" sz="quarter" idx="4294967295"/>
-          </p:nvPr>
-        </p:nvSpPr>
-        <p:spPr>
-          <a:xfrm>
-            <a:off x="9448800" y="6492874"/>
-            <a:ext cx="2743200" cy="365125"/>
-          </a:xfrm>
-          <a:prstGeom prst="rect">
-            <a:avLst/>
-          </a:prstGeom>
-        </p:spPr>
-        <p:txBody>
-          <a:bodyPr/>
-          <a:lstStyle/>
-          <a:p>
-            <a:pPr>
-              <a:defRPr/>
-            </a:pPr>
-            <a:endParaRPr lang="it-IT" dirty="0"/>
           </a:p>
         </p:txBody>
       </p:sp>
@@ -29685,36 +28598,6 @@
       </p:sp>
       <p:sp>
         <p:nvSpPr>
-          <p:cNvPr id="3" name="Segnaposto numero diapositiva 2"/>
-          <p:cNvSpPr>
-            <a:spLocks noGrp="1"/>
-          </p:cNvSpPr>
-          <p:nvPr>
-            <p:ph type="sldNum" sz="quarter" idx="4294967295"/>
-          </p:nvPr>
-        </p:nvSpPr>
-        <p:spPr>
-          <a:xfrm>
-            <a:off x="9448800" y="6492874"/>
-            <a:ext cx="2743200" cy="365125"/>
-          </a:xfrm>
-          <a:prstGeom prst="rect">
-            <a:avLst/>
-          </a:prstGeom>
-        </p:spPr>
-        <p:txBody>
-          <a:bodyPr/>
-          <a:lstStyle/>
-          <a:p>
-            <a:pPr>
-              <a:defRPr/>
-            </a:pPr>
-            <a:endParaRPr lang="it-IT" dirty="0"/>
-          </a:p>
-        </p:txBody>
-      </p:sp>
-      <p:sp>
-        <p:nvSpPr>
           <p:cNvPr id="4" name="Segnaposto contenuto 3"/>
           <p:cNvSpPr>
             <a:spLocks noGrp="1"/>
@@ -29858,36 +28741,6 @@
               <a:rPr lang="it-IT" noProof="0" dirty="0"/>
               <a:t>DB documentali popolari</a:t>
             </a:r>
-          </a:p>
-        </p:txBody>
-      </p:sp>
-      <p:sp>
-        <p:nvSpPr>
-          <p:cNvPr id="3" name="Segnaposto numero diapositiva 2"/>
-          <p:cNvSpPr>
-            <a:spLocks noGrp="1"/>
-          </p:cNvSpPr>
-          <p:nvPr>
-            <p:ph type="sldNum" sz="quarter" idx="4294967295"/>
-          </p:nvPr>
-        </p:nvSpPr>
-        <p:spPr>
-          <a:xfrm>
-            <a:off x="9448800" y="6492874"/>
-            <a:ext cx="2743200" cy="365125"/>
-          </a:xfrm>
-          <a:prstGeom prst="rect">
-            <a:avLst/>
-          </a:prstGeom>
-        </p:spPr>
-        <p:txBody>
-          <a:bodyPr/>
-          <a:lstStyle/>
-          <a:p>
-            <a:pPr>
-              <a:defRPr/>
-            </a:pPr>
-            <a:endParaRPr lang="it-IT" dirty="0"/>
           </a:p>
         </p:txBody>
       </p:sp>
@@ -30095,36 +28948,6 @@
       </p:sp>
       <p:sp>
         <p:nvSpPr>
-          <p:cNvPr id="3" name="Segnaposto numero diapositiva 2"/>
-          <p:cNvSpPr>
-            <a:spLocks noGrp="1"/>
-          </p:cNvSpPr>
-          <p:nvPr>
-            <p:ph type="sldNum" sz="quarter" idx="4294967295"/>
-          </p:nvPr>
-        </p:nvSpPr>
-        <p:spPr>
-          <a:xfrm>
-            <a:off x="9448800" y="6492874"/>
-            <a:ext cx="2743200" cy="365125"/>
-          </a:xfrm>
-          <a:prstGeom prst="rect">
-            <a:avLst/>
-          </a:prstGeom>
-        </p:spPr>
-        <p:txBody>
-          <a:bodyPr/>
-          <a:lstStyle/>
-          <a:p>
-            <a:pPr>
-              <a:defRPr/>
-            </a:pPr>
-            <a:endParaRPr lang="it-IT" dirty="0"/>
-          </a:p>
-        </p:txBody>
-      </p:sp>
-      <p:sp>
-        <p:nvSpPr>
           <p:cNvPr id="4" name="Segnaposto contenuto 3"/>
           <p:cNvSpPr>
             <a:spLocks noGrp="1"/>
@@ -30475,36 +29298,6 @@
       </p:sp>
       <p:sp>
         <p:nvSpPr>
-          <p:cNvPr id="3" name="Segnaposto numero diapositiva 2"/>
-          <p:cNvSpPr>
-            <a:spLocks noGrp="1"/>
-          </p:cNvSpPr>
-          <p:nvPr>
-            <p:ph type="sldNum" sz="quarter" idx="4294967295"/>
-          </p:nvPr>
-        </p:nvSpPr>
-        <p:spPr>
-          <a:xfrm>
-            <a:off x="9448800" y="6492874"/>
-            <a:ext cx="2743200" cy="365125"/>
-          </a:xfrm>
-          <a:prstGeom prst="rect">
-            <a:avLst/>
-          </a:prstGeom>
-        </p:spPr>
-        <p:txBody>
-          <a:bodyPr/>
-          <a:lstStyle/>
-          <a:p>
-            <a:pPr>
-              <a:defRPr/>
-            </a:pPr>
-            <a:endParaRPr lang="it-IT" dirty="0"/>
-          </a:p>
-        </p:txBody>
-      </p:sp>
-      <p:sp>
-        <p:nvSpPr>
           <p:cNvPr id="4" name="Segnaposto contenuto 3"/>
           <p:cNvSpPr>
             <a:spLocks noGrp="1"/>
@@ -30679,36 +29472,6 @@
       </p:sp>
       <p:sp>
         <p:nvSpPr>
-          <p:cNvPr id="3" name="Segnaposto numero diapositiva 2"/>
-          <p:cNvSpPr>
-            <a:spLocks noGrp="1"/>
-          </p:cNvSpPr>
-          <p:nvPr>
-            <p:ph type="sldNum" sz="quarter" idx="4294967295"/>
-          </p:nvPr>
-        </p:nvSpPr>
-        <p:spPr>
-          <a:xfrm>
-            <a:off x="9448800" y="6492874"/>
-            <a:ext cx="2743200" cy="365125"/>
-          </a:xfrm>
-          <a:prstGeom prst="rect">
-            <a:avLst/>
-          </a:prstGeom>
-        </p:spPr>
-        <p:txBody>
-          <a:bodyPr/>
-          <a:lstStyle/>
-          <a:p>
-            <a:pPr>
-              <a:defRPr/>
-            </a:pPr>
-            <a:endParaRPr lang="it-IT" dirty="0"/>
-          </a:p>
-        </p:txBody>
-      </p:sp>
-      <p:sp>
-        <p:nvSpPr>
           <p:cNvPr id="4" name="Segnaposto contenuto 3"/>
           <p:cNvSpPr>
             <a:spLocks noGrp="1"/>
@@ -30848,36 +29611,6 @@
               <a:rPr lang="it-IT" noProof="0" dirty="0"/>
               <a:t>-family popolari</a:t>
             </a:r>
-          </a:p>
-        </p:txBody>
-      </p:sp>
-      <p:sp>
-        <p:nvSpPr>
-          <p:cNvPr id="3" name="Segnaposto numero diapositiva 2"/>
-          <p:cNvSpPr>
-            <a:spLocks noGrp="1"/>
-          </p:cNvSpPr>
-          <p:nvPr>
-            <p:ph type="sldNum" sz="quarter" idx="4294967295"/>
-          </p:nvPr>
-        </p:nvSpPr>
-        <p:spPr>
-          <a:xfrm>
-            <a:off x="9448800" y="6492874"/>
-            <a:ext cx="2743200" cy="365125"/>
-          </a:xfrm>
-          <a:prstGeom prst="rect">
-            <a:avLst/>
-          </a:prstGeom>
-        </p:spPr>
-        <p:txBody>
-          <a:bodyPr/>
-          <a:lstStyle/>
-          <a:p>
-            <a:pPr>
-              <a:defRPr/>
-            </a:pPr>
-            <a:endParaRPr lang="it-IT" dirty="0"/>
           </a:p>
         </p:txBody>
       </p:sp>
@@ -31187,36 +29920,6 @@
           </a:p>
         </p:txBody>
       </p:sp>
-      <p:sp>
-        <p:nvSpPr>
-          <p:cNvPr id="3" name="Segnaposto numero diapositiva 2"/>
-          <p:cNvSpPr>
-            <a:spLocks noGrp="1"/>
-          </p:cNvSpPr>
-          <p:nvPr>
-            <p:ph type="sldNum" sz="quarter" idx="4294967295"/>
-          </p:nvPr>
-        </p:nvSpPr>
-        <p:spPr>
-          <a:xfrm>
-            <a:off x="9448800" y="6492874"/>
-            <a:ext cx="2743200" cy="365125"/>
-          </a:xfrm>
-          <a:prstGeom prst="rect">
-            <a:avLst/>
-          </a:prstGeom>
-        </p:spPr>
-        <p:txBody>
-          <a:bodyPr/>
-          <a:lstStyle/>
-          <a:p>
-            <a:pPr>
-              <a:defRPr/>
-            </a:pPr>
-            <a:endParaRPr lang="it-IT" dirty="0"/>
-          </a:p>
-        </p:txBody>
-      </p:sp>
     </p:spTree>
     <p:extLst>
       <p:ext uri="{BB962C8B-B14F-4D97-AF65-F5344CB8AC3E}">
@@ -31616,36 +30319,6 @@
           </a:p>
         </p:txBody>
       </p:sp>
-      <p:sp>
-        <p:nvSpPr>
-          <p:cNvPr id="3" name="Segnaposto numero diapositiva 2"/>
-          <p:cNvSpPr>
-            <a:spLocks noGrp="1"/>
-          </p:cNvSpPr>
-          <p:nvPr>
-            <p:ph type="sldNum" sz="quarter" idx="4294967295"/>
-          </p:nvPr>
-        </p:nvSpPr>
-        <p:spPr>
-          <a:xfrm>
-            <a:off x="9448800" y="6492874"/>
-            <a:ext cx="2743200" cy="365125"/>
-          </a:xfrm>
-          <a:prstGeom prst="rect">
-            <a:avLst/>
-          </a:prstGeom>
-        </p:spPr>
-        <p:txBody>
-          <a:bodyPr/>
-          <a:lstStyle/>
-          <a:p>
-            <a:pPr>
-              <a:defRPr/>
-            </a:pPr>
-            <a:endParaRPr lang="it-IT" dirty="0"/>
-          </a:p>
-        </p:txBody>
-      </p:sp>
     </p:spTree>
     <p:extLst>
       <p:ext uri="{BB962C8B-B14F-4D97-AF65-F5344CB8AC3E}">
@@ -31719,36 +30392,6 @@
       </p:sp>
       <p:sp>
         <p:nvSpPr>
-          <p:cNvPr id="3" name="Segnaposto numero diapositiva 2"/>
-          <p:cNvSpPr>
-            <a:spLocks noGrp="1"/>
-          </p:cNvSpPr>
-          <p:nvPr>
-            <p:ph type="sldNum" sz="quarter" idx="4294967295"/>
-          </p:nvPr>
-        </p:nvSpPr>
-        <p:spPr>
-          <a:xfrm>
-            <a:off x="9448800" y="6492874"/>
-            <a:ext cx="2743200" cy="365125"/>
-          </a:xfrm>
-          <a:prstGeom prst="rect">
-            <a:avLst/>
-          </a:prstGeom>
-        </p:spPr>
-        <p:txBody>
-          <a:bodyPr/>
-          <a:lstStyle/>
-          <a:p>
-            <a:pPr>
-              <a:defRPr/>
-            </a:pPr>
-            <a:endParaRPr lang="it-IT" dirty="0"/>
-          </a:p>
-        </p:txBody>
-      </p:sp>
-      <p:sp>
-        <p:nvSpPr>
           <p:cNvPr id="4" name="Segnaposto contenuto 3"/>
           <p:cNvSpPr>
             <a:spLocks noGrp="1"/>
@@ -31871,36 +30514,6 @@
               <a:rPr lang="it-IT" noProof="0" dirty="0"/>
               <a:t>DB a grafo popolari</a:t>
             </a:r>
-          </a:p>
-        </p:txBody>
-      </p:sp>
-      <p:sp>
-        <p:nvSpPr>
-          <p:cNvPr id="3" name="Segnaposto numero diapositiva 2"/>
-          <p:cNvSpPr>
-            <a:spLocks noGrp="1"/>
-          </p:cNvSpPr>
-          <p:nvPr>
-            <p:ph type="sldNum" sz="quarter" idx="4294967295"/>
-          </p:nvPr>
-        </p:nvSpPr>
-        <p:spPr>
-          <a:xfrm>
-            <a:off x="9448800" y="6492874"/>
-            <a:ext cx="2743200" cy="365125"/>
-          </a:xfrm>
-          <a:prstGeom prst="rect">
-            <a:avLst/>
-          </a:prstGeom>
-        </p:spPr>
-        <p:txBody>
-          <a:bodyPr/>
-          <a:lstStyle/>
-          <a:p>
-            <a:pPr>
-              <a:defRPr/>
-            </a:pPr>
-            <a:endParaRPr lang="it-IT" dirty="0"/>
           </a:p>
         </p:txBody>
       </p:sp>
@@ -32224,36 +30837,6 @@
           </a:p>
         </p:txBody>
       </p:sp>
-      <p:sp>
-        <p:nvSpPr>
-          <p:cNvPr id="3" name="Segnaposto numero diapositiva 2"/>
-          <p:cNvSpPr>
-            <a:spLocks noGrp="1"/>
-          </p:cNvSpPr>
-          <p:nvPr>
-            <p:ph type="sldNum" sz="quarter" idx="4294967295"/>
-          </p:nvPr>
-        </p:nvSpPr>
-        <p:spPr>
-          <a:xfrm>
-            <a:off x="9448800" y="6492874"/>
-            <a:ext cx="2743200" cy="365125"/>
-          </a:xfrm>
-          <a:prstGeom prst="rect">
-            <a:avLst/>
-          </a:prstGeom>
-        </p:spPr>
-        <p:txBody>
-          <a:bodyPr/>
-          <a:lstStyle/>
-          <a:p>
-            <a:pPr>
-              <a:defRPr/>
-            </a:pPr>
-            <a:endParaRPr lang="it-IT" dirty="0"/>
-          </a:p>
-        </p:txBody>
-      </p:sp>
     </p:spTree>
     <p:extLst>
       <p:ext uri="{BB962C8B-B14F-4D97-AF65-F5344CB8AC3E}">
@@ -32407,36 +30990,6 @@
           </a:p>
         </p:txBody>
       </p:sp>
-      <p:sp>
-        <p:nvSpPr>
-          <p:cNvPr id="3" name="Segnaposto numero diapositiva 2"/>
-          <p:cNvSpPr>
-            <a:spLocks noGrp="1"/>
-          </p:cNvSpPr>
-          <p:nvPr>
-            <p:ph type="sldNum" sz="quarter" idx="4294967295"/>
-          </p:nvPr>
-        </p:nvSpPr>
-        <p:spPr>
-          <a:xfrm>
-            <a:off x="9448800" y="6492874"/>
-            <a:ext cx="2743200" cy="365125"/>
-          </a:xfrm>
-          <a:prstGeom prst="rect">
-            <a:avLst/>
-          </a:prstGeom>
-        </p:spPr>
-        <p:txBody>
-          <a:bodyPr/>
-          <a:lstStyle/>
-          <a:p>
-            <a:pPr>
-              <a:defRPr/>
-            </a:pPr>
-            <a:endParaRPr lang="it-IT" dirty="0"/>
-          </a:p>
-        </p:txBody>
-      </p:sp>
     </p:spTree>
     <p:extLst>
       <p:ext uri="{BB962C8B-B14F-4D97-AF65-F5344CB8AC3E}">
@@ -32502,36 +31055,6 @@
       </p:sp>
       <p:sp>
         <p:nvSpPr>
-          <p:cNvPr id="3" name="Segnaposto numero diapositiva 2"/>
-          <p:cNvSpPr>
-            <a:spLocks noGrp="1"/>
-          </p:cNvSpPr>
-          <p:nvPr>
-            <p:ph type="sldNum" sz="quarter" idx="4294967295"/>
-          </p:nvPr>
-        </p:nvSpPr>
-        <p:spPr>
-          <a:xfrm>
-            <a:off x="9448800" y="6492874"/>
-            <a:ext cx="2743200" cy="365125"/>
-          </a:xfrm>
-          <a:prstGeom prst="rect">
-            <a:avLst/>
-          </a:prstGeom>
-        </p:spPr>
-        <p:txBody>
-          <a:bodyPr/>
-          <a:lstStyle/>
-          <a:p>
-            <a:pPr>
-              <a:defRPr/>
-            </a:pPr>
-            <a:endParaRPr lang="it-IT" dirty="0"/>
-          </a:p>
-        </p:txBody>
-      </p:sp>
-      <p:sp>
-        <p:nvSpPr>
           <p:cNvPr id="4" name="Segnaposto contenuto 3"/>
           <p:cNvSpPr>
             <a:spLocks noGrp="1"/>
@@ -32645,36 +31168,6 @@
               <a:rPr lang="it-IT" noProof="0" dirty="0"/>
               <a:t>Persistenza poliglotta</a:t>
             </a:r>
-          </a:p>
-        </p:txBody>
-      </p:sp>
-      <p:sp>
-        <p:nvSpPr>
-          <p:cNvPr id="3" name="Segnaposto numero diapositiva 2"/>
-          <p:cNvSpPr>
-            <a:spLocks noGrp="1"/>
-          </p:cNvSpPr>
-          <p:nvPr>
-            <p:ph type="sldNum" sz="quarter" idx="4294967295"/>
-          </p:nvPr>
-        </p:nvSpPr>
-        <p:spPr>
-          <a:xfrm>
-            <a:off x="9448800" y="6492874"/>
-            <a:ext cx="2743200" cy="365125"/>
-          </a:xfrm>
-          <a:prstGeom prst="rect">
-            <a:avLst/>
-          </a:prstGeom>
-        </p:spPr>
-        <p:txBody>
-          <a:bodyPr/>
-          <a:lstStyle/>
-          <a:p>
-            <a:pPr>
-              <a:defRPr/>
-            </a:pPr>
-            <a:endParaRPr lang="it-IT" dirty="0"/>
           </a:p>
         </p:txBody>
       </p:sp>
@@ -32876,36 +31369,6 @@
               <a:rPr lang="it-IT" noProof="0" dirty="0"/>
               <a:t>La scelta del database</a:t>
             </a:r>
-          </a:p>
-        </p:txBody>
-      </p:sp>
-      <p:sp>
-        <p:nvSpPr>
-          <p:cNvPr id="3" name="Segnaposto numero diapositiva 2"/>
-          <p:cNvSpPr>
-            <a:spLocks noGrp="1"/>
-          </p:cNvSpPr>
-          <p:nvPr>
-            <p:ph type="sldNum" sz="quarter" idx="4294967295"/>
-          </p:nvPr>
-        </p:nvSpPr>
-        <p:spPr>
-          <a:xfrm>
-            <a:off x="9448800" y="6492874"/>
-            <a:ext cx="2743200" cy="365125"/>
-          </a:xfrm>
-          <a:prstGeom prst="rect">
-            <a:avLst/>
-          </a:prstGeom>
-        </p:spPr>
-        <p:txBody>
-          <a:bodyPr/>
-          <a:lstStyle/>
-          <a:p>
-            <a:pPr>
-              <a:defRPr/>
-            </a:pPr>
-            <a:endParaRPr lang="it-IT" dirty="0"/>
           </a:p>
         </p:txBody>
       </p:sp>
@@ -34440,36 +32903,6 @@
               <a:rPr lang="it-IT" noProof="0" dirty="0"/>
               <a:t>Persistenza poliglotta in azienda</a:t>
             </a:r>
-          </a:p>
-        </p:txBody>
-      </p:sp>
-      <p:sp>
-        <p:nvSpPr>
-          <p:cNvPr id="3" name="Segnaposto numero diapositiva 2"/>
-          <p:cNvSpPr>
-            <a:spLocks noGrp="1"/>
-          </p:cNvSpPr>
-          <p:nvPr>
-            <p:ph type="sldNum" sz="quarter" idx="4294967295"/>
-          </p:nvPr>
-        </p:nvSpPr>
-        <p:spPr>
-          <a:xfrm>
-            <a:off x="9448800" y="6492874"/>
-            <a:ext cx="2743200" cy="365125"/>
-          </a:xfrm>
-          <a:prstGeom prst="rect">
-            <a:avLst/>
-          </a:prstGeom>
-        </p:spPr>
-        <p:txBody>
-          <a:bodyPr/>
-          <a:lstStyle/>
-          <a:p>
-            <a:pPr>
-              <a:defRPr/>
-            </a:pPr>
-            <a:endParaRPr lang="it-IT" dirty="0"/>
           </a:p>
         </p:txBody>
       </p:sp>

</xml_diff>